<commit_message>
Adding our presentation deck and final report template.
</commit_message>
<xml_diff>
--- a/Presentation/Anubhai Philip Scaria.pptx
+++ b/Presentation/Anubhai Philip Scaria.pptx
@@ -3160,7 +3160,9 @@
         </p:nvSpPr>
         <p:spPr/>
         <p:txBody>
-          <a:bodyPr/>
+          <a:bodyPr>
+            <a:normAutofit fontScale="70000" lnSpcReduction="20000"/>
+          </a:bodyPr>
           <a:lstStyle/>
           <a:p>
             <a:r>
@@ -3203,9 +3205,54 @@
           <a:p>
             <a:r>
               <a:rPr lang="en-US" dirty="0" smtClean="0"/>
-              <a:t>Rose Marie Philip</a:t>
-            </a:r>
-            <a:endParaRPr lang="en-US" dirty="0"/>
+              <a:t>Rose Marie </a:t>
+            </a:r>
+            <a:r>
+              <a:rPr lang="en-US" dirty="0" smtClean="0"/>
+              <a:t>Philip</a:t>
+            </a:r>
+          </a:p>
+          <a:p>
+            <a:endParaRPr lang="en-US" dirty="0" smtClean="0"/>
+          </a:p>
+          <a:p>
+            <a:r>
+              <a:rPr lang="en-US" i="1" dirty="0" smtClean="0">
+                <a:solidFill>
+                  <a:schemeClr val="tx1"/>
+                </a:solidFill>
+              </a:rPr>
+              <a:t>Guided by – Jonathan </a:t>
+            </a:r>
+            <a:r>
+              <a:rPr lang="en-US" i="1" dirty="0" err="1" smtClean="0">
+                <a:solidFill>
+                  <a:schemeClr val="tx1"/>
+                </a:solidFill>
+              </a:rPr>
+              <a:t>Berant</a:t>
+            </a:r>
+            <a:r>
+              <a:rPr lang="en-US" i="1" dirty="0" smtClean="0">
+                <a:solidFill>
+                  <a:schemeClr val="tx1"/>
+                </a:solidFill>
+              </a:rPr>
+              <a:t>, Post Doc in </a:t>
+            </a:r>
+            <a:r>
+              <a:rPr lang="en-US" i="1" smtClean="0">
+                <a:solidFill>
+                  <a:schemeClr val="tx1"/>
+                </a:solidFill>
+              </a:rPr>
+              <a:t>NLP Group</a:t>
+            </a:r>
+            <a:endParaRPr lang="en-US" i="1" dirty="0">
+              <a:solidFill>
+                <a:schemeClr val="tx1"/>
+              </a:solidFill>
+            </a:endParaRPr>
           </a:p>
         </p:txBody>
       </p:sp>

</xml_diff>